<commit_message>
TRC 02 und 08 neue Lizenzen eingepflegt
</commit_message>
<xml_diff>
--- a/training-cards/music moves/Training Cards (TRC)/ger/apprentice/ger_TCR_08_Rezension_MM_A.pptx
+++ b/training-cards/music moves/Training Cards (TRC)/ger/apprentice/ger_TCR_08_Rezension_MM_A.pptx
@@ -105,6 +105,22 @@
       </a:defRPr>
     </a:lvl9pPr>
   </p:defaultTextStyle>
+  <p:extLst>
+    <p:ext uri="{EFAFB233-063F-42B5-8137-9DF3F51BA10A}">
+      <p15:sldGuideLst xmlns:p15="http://schemas.microsoft.com/office/powerpoint/2012/main">
+        <p15:guide id="1" orient="horz" pos="652">
+          <p15:clr>
+            <a:srgbClr val="A4A3A4"/>
+          </p15:clr>
+        </p15:guide>
+        <p15:guide id="2">
+          <p15:clr>
+            <a:srgbClr val="A4A3A4"/>
+          </p15:clr>
+        </p15:guide>
+      </p15:sldGuideLst>
+    </p:ext>
+  </p:extLst>
 </p:presentation>
 </file>
 
@@ -153,10 +169,9 @@
           </a:lstStyle>
           <a:p>
             <a:r>
-              <a:rPr lang="de-DE" dirty="0" smtClean="0"/>
+              <a:rPr lang="de-DE" dirty="0"/>
               <a:t>TITEL HINZUFÜGEN</a:t>
             </a:r>
-            <a:endParaRPr lang="de-DE" dirty="0"/>
           </a:p>
         </p:txBody>
       </p:sp>
@@ -187,35 +202,35 @@
           <a:p>
             <a:pPr lvl="0"/>
             <a:r>
-              <a:rPr lang="de-DE" smtClean="0"/>
+              <a:rPr lang="de-DE"/>
               <a:t>Mastertextformat bearbeiten</a:t>
             </a:r>
           </a:p>
           <a:p>
             <a:pPr lvl="1"/>
             <a:r>
-              <a:rPr lang="de-DE" smtClean="0"/>
+              <a:rPr lang="de-DE"/>
               <a:t>Zweite Ebene</a:t>
             </a:r>
           </a:p>
           <a:p>
             <a:pPr lvl="2"/>
             <a:r>
-              <a:rPr lang="de-DE" smtClean="0"/>
+              <a:rPr lang="de-DE"/>
               <a:t>Dritte Ebene</a:t>
             </a:r>
           </a:p>
           <a:p>
             <a:pPr lvl="3"/>
             <a:r>
-              <a:rPr lang="de-DE" smtClean="0"/>
+              <a:rPr lang="de-DE"/>
               <a:t>Vierte Ebene</a:t>
             </a:r>
           </a:p>
           <a:p>
             <a:pPr lvl="4"/>
             <a:r>
-              <a:rPr lang="de-DE" smtClean="0"/>
+              <a:rPr lang="de-DE"/>
               <a:t>Fünfte Ebene</a:t>
             </a:r>
             <a:endParaRPr lang="de-DE" dirty="0"/>
@@ -262,7 +277,7 @@
               <a:buNone/>
             </a:pPr>
             <a:r>
-              <a:rPr lang="de-DE" smtClean="0"/>
+              <a:rPr lang="de-DE"/>
               <a:t>Master-Untertitelformat bearbeiten</a:t>
             </a:r>
             <a:endParaRPr lang="de-DE" dirty="0"/>
@@ -378,35 +393,35 @@
           <a:p>
             <a:pPr lvl="0"/>
             <a:r>
-              <a:rPr lang="de-DE" smtClean="0"/>
+              <a:rPr lang="de-DE"/>
               <a:t>Mastertextformat bearbeiten</a:t>
             </a:r>
           </a:p>
           <a:p>
             <a:pPr lvl="1"/>
             <a:r>
-              <a:rPr lang="de-DE" smtClean="0"/>
+              <a:rPr lang="de-DE"/>
               <a:t>Zweite Ebene</a:t>
             </a:r>
           </a:p>
           <a:p>
             <a:pPr lvl="2"/>
             <a:r>
-              <a:rPr lang="de-DE" smtClean="0"/>
+              <a:rPr lang="de-DE"/>
               <a:t>Dritte Ebene</a:t>
             </a:r>
           </a:p>
           <a:p>
             <a:pPr lvl="3"/>
             <a:r>
-              <a:rPr lang="de-DE" smtClean="0"/>
+              <a:rPr lang="de-DE"/>
               <a:t>Vierte Ebene</a:t>
             </a:r>
           </a:p>
           <a:p>
             <a:pPr lvl="4"/>
             <a:r>
-              <a:rPr lang="de-DE" smtClean="0"/>
+              <a:rPr lang="de-DE"/>
               <a:t>Fünfte Ebene</a:t>
             </a:r>
             <a:endParaRPr lang="de-DE" dirty="0"/>
@@ -436,7 +451,7 @@
           <a:lstStyle/>
           <a:p>
             <a:r>
-              <a:rPr lang="de-DE" sz="2400" dirty="0" smtClean="0">
+              <a:rPr lang="de-DE" sz="2400" dirty="0">
                 <a:solidFill>
                   <a:srgbClr val="7E006B"/>
                 </a:solidFill>
@@ -446,7 +461,7 @@
               <a:t>TRAININGS</a:t>
             </a:r>
             <a:r>
-              <a:rPr lang="de-DE" sz="2400" dirty="0" smtClean="0">
+              <a:rPr lang="de-DE" sz="2400" dirty="0">
                 <a:solidFill>
                   <a:srgbClr val="7E006B"/>
                 </a:solidFill>
@@ -495,143 +510,6 @@
           </a:prstGeom>
         </p:spPr>
       </p:pic>
-      <p:sp>
-        <p:nvSpPr>
-          <p:cNvPr id="5" name="Shape 7"/>
-          <p:cNvSpPr/>
-          <p:nvPr userDrawn="1"/>
-        </p:nvSpPr>
-        <p:spPr>
-          <a:xfrm>
-            <a:off x="1683417" y="4952581"/>
-            <a:ext cx="4196016" cy="276995"/>
-          </a:xfrm>
-          <a:prstGeom prst="rect">
-            <a:avLst/>
-          </a:prstGeom>
-          <a:ln w="12700">
-            <a:miter lim="400000"/>
-          </a:ln>
-          <a:extLst>
-            <a:ext uri="{C572A759-6A51-4108-AA02-DFA0A04FC94B}">
-              <ma14:wrappingTextBoxFlag xmlns:ma14="http://schemas.microsoft.com/office/mac/drawingml/2011/main" val="1"/>
-            </a:ext>
-          </a:extLst>
-        </p:spPr>
-        <p:txBody>
-          <a:bodyPr wrap="none" lIns="45718" tIns="45718" rIns="45718" bIns="45718">
-            <a:spAutoFit/>
-          </a:bodyPr>
-          <a:lstStyle/>
-          <a:p>
-            <a:pPr lvl="0" algn="ctr">
-              <a:defRPr sz="1800"/>
-            </a:pPr>
-            <a:r>
-              <a:rPr sz="600" dirty="0">
-                <a:latin typeface="Avenir Light"/>
-                <a:ea typeface="Calibri"/>
-                <a:cs typeface="Avenir Light"/>
-                <a:sym typeface="Calibri"/>
-              </a:rPr>
-              <a:t>This work is licensed under the Creative Commons Attribution-NonCommercial-NoDerivatives 4.0 International License. </a:t>
-            </a:r>
-          </a:p>
-          <a:p>
-            <a:pPr lvl="0" algn="ctr">
-              <a:defRPr sz="1800"/>
-            </a:pPr>
-            <a:r>
-              <a:rPr sz="600" dirty="0">
-                <a:latin typeface="Avenir Light"/>
-                <a:ea typeface="Calibri"/>
-                <a:cs typeface="Avenir Light"/>
-                <a:sym typeface="Calibri"/>
-              </a:rPr>
-              <a:t>To view a copy of this license, visit http://creativecommons.org/licenses/by-nc-nd/4.0/.</a:t>
-            </a:r>
-          </a:p>
-        </p:txBody>
-      </p:sp>
-      <p:pic>
-        <p:nvPicPr>
-          <p:cNvPr id="6" name="pasted-image.tif"/>
-          <p:cNvPicPr/>
-          <p:nvPr userDrawn="1"/>
-        </p:nvPicPr>
-        <p:blipFill>
-          <a:blip r:embed="rId4">
-            <a:extLst/>
-          </a:blip>
-          <a:stretch>
-            <a:fillRect/>
-          </a:stretch>
-        </p:blipFill>
-        <p:spPr>
-          <a:xfrm>
-            <a:off x="6174185" y="4992838"/>
-            <a:ext cx="886619" cy="214128"/>
-          </a:xfrm>
-          <a:prstGeom prst="rect">
-            <a:avLst/>
-          </a:prstGeom>
-          <a:ln w="12700">
-            <a:miter lim="400000"/>
-          </a:ln>
-        </p:spPr>
-      </p:pic>
-      <p:sp>
-        <p:nvSpPr>
-          <p:cNvPr id="7" name="Textfeld 6"/>
-          <p:cNvSpPr txBox="1"/>
-          <p:nvPr userDrawn="1"/>
-        </p:nvSpPr>
-        <p:spPr>
-          <a:xfrm>
-            <a:off x="239285" y="4936890"/>
-            <a:ext cx="1044856" cy="276999"/>
-          </a:xfrm>
-          <a:prstGeom prst="rect">
-            <a:avLst/>
-          </a:prstGeom>
-          <a:noFill/>
-        </p:spPr>
-        <p:txBody>
-          <a:bodyPr wrap="square" rtlCol="0">
-            <a:spAutoFit/>
-          </a:bodyPr>
-          <a:lstStyle/>
-          <a:p>
-            <a:r>
-              <a:rPr lang="de-DE" sz="600" dirty="0">
-                <a:solidFill>
-                  <a:srgbClr val="5D5E5F"/>
-                </a:solidFill>
-                <a:latin typeface="Avenir Light"/>
-                <a:cs typeface="Avenir Light"/>
-              </a:rPr>
-              <a:t>Letzte Änderung: </a:t>
-            </a:r>
-            <a:fld id="{7A8C7DAC-E536-564C-B5B3-90E8FAB50562}" type="datetime1">
-              <a:rPr lang="de-DE" sz="600" smtClean="0">
-                <a:solidFill>
-                  <a:srgbClr val="5D5E5F"/>
-                </a:solidFill>
-                <a:latin typeface="Avenir Light"/>
-                <a:cs typeface="Avenir Light"/>
-              </a:rPr>
-              <a:t>24.01.16</a:t>
-            </a:fld>
-            <a:endParaRPr lang="de-DE" sz="600" dirty="0">
-              <a:solidFill>
-                <a:srgbClr val="5D5E5F"/>
-              </a:solidFill>
-              <a:latin typeface="Avenir Light"/>
-              <a:cs typeface="Avenir Light"/>
-            </a:endParaRPr>
-          </a:p>
-        </p:txBody>
-      </p:sp>
     </p:spTree>
     <p:extLst>
       <p:ext uri="{BB962C8B-B14F-4D97-AF65-F5344CB8AC3E}">
@@ -678,10 +556,9 @@
           <a:lstStyle/>
           <a:p>
             <a:r>
-              <a:rPr lang="de-DE" smtClean="0"/>
+              <a:rPr lang="de-DE"/>
               <a:t>Mastertitelformat bearbeiten</a:t>
             </a:r>
-            <a:endParaRPr lang="de-DE"/>
           </a:p>
         </p:txBody>
       </p:sp>
@@ -702,7 +579,7 @@
           <a:p>
             <a:fld id="{FF5B2BAF-DF38-0A48-A798-0C06E514FD52}" type="datetimeFigureOut">
               <a:rPr lang="de-DE" smtClean="0"/>
-              <a:t>24.01.16</a:t>
+              <a:t>25.07.23</a:t>
             </a:fld>
             <a:endParaRPr lang="de-DE" dirty="0"/>
           </a:p>
@@ -813,17 +690,16 @@
           <a:p>
             <a:pPr marL="0" lvl="0" algn="l"/>
             <a:r>
-              <a:rPr lang="de-DE" dirty="0" smtClean="0"/>
+              <a:rPr lang="de-DE" dirty="0"/>
               <a:t>Überschrift </a:t>
             </a:r>
             <a:br>
-              <a:rPr lang="de-DE" dirty="0" smtClean="0"/>
+              <a:rPr lang="de-DE" dirty="0"/>
             </a:br>
             <a:r>
-              <a:rPr lang="de-DE" dirty="0" smtClean="0"/>
+              <a:rPr lang="de-DE" dirty="0"/>
               <a:t>bearbeiten </a:t>
             </a:r>
-            <a:endParaRPr lang="de-DE" dirty="0"/>
           </a:p>
         </p:txBody>
       </p:sp>
@@ -854,38 +730,37 @@
           <a:p>
             <a:pPr lvl="0"/>
             <a:r>
-              <a:rPr lang="de-DE" dirty="0" smtClean="0"/>
+              <a:rPr lang="de-DE" dirty="0"/>
               <a:t>Mastertextformat bearbeiten</a:t>
             </a:r>
           </a:p>
           <a:p>
             <a:pPr lvl="1"/>
             <a:r>
-              <a:rPr lang="de-DE" dirty="0" smtClean="0"/>
+              <a:rPr lang="de-DE" dirty="0"/>
               <a:t>Zweite Ebene</a:t>
             </a:r>
           </a:p>
           <a:p>
             <a:pPr lvl="2"/>
             <a:r>
-              <a:rPr lang="de-DE" dirty="0" smtClean="0"/>
+              <a:rPr lang="de-DE" dirty="0"/>
               <a:t>Dritte Ebene</a:t>
             </a:r>
           </a:p>
           <a:p>
             <a:pPr lvl="3"/>
             <a:r>
-              <a:rPr lang="de-DE" dirty="0" smtClean="0"/>
+              <a:rPr lang="de-DE" dirty="0"/>
               <a:t>Vierte Ebene</a:t>
             </a:r>
           </a:p>
           <a:p>
             <a:pPr lvl="4"/>
             <a:r>
-              <a:rPr lang="de-DE" dirty="0" smtClean="0"/>
+              <a:rPr lang="de-DE" dirty="0"/>
               <a:t>Fünfte Ebene</a:t>
             </a:r>
-            <a:endParaRPr lang="de-DE" dirty="0"/>
           </a:p>
         </p:txBody>
       </p:sp>
@@ -924,7 +799,7 @@
           <a:p>
             <a:fld id="{FF5B2BAF-DF38-0A48-A798-0C06E514FD52}" type="datetimeFigureOut">
               <a:rPr lang="de-DE" smtClean="0"/>
-              <a:t>24.01.16</a:t>
+              <a:t>25.07.23</a:t>
             </a:fld>
             <a:endParaRPr lang="de-DE" dirty="0"/>
           </a:p>
@@ -1158,7 +1033,7 @@
           <a:lstStyle/>
           <a:p>
             <a:r>
-              <a:rPr lang="de-DE" sz="1050" b="1" dirty="0" smtClean="0">
+              <a:rPr lang="de-DE" sz="1050" b="1" dirty="0">
                 <a:solidFill>
                   <a:schemeClr val="bg1"/>
                 </a:solidFill>
@@ -1168,7 +1043,7 @@
               <a:t>TRAININGSKARTE</a:t>
             </a:r>
             <a:r>
-              <a:rPr lang="de-DE" sz="1050" dirty="0" smtClean="0">
+              <a:rPr lang="de-DE" sz="1050" dirty="0">
                 <a:solidFill>
                   <a:schemeClr val="bg1"/>
                 </a:solidFill>
@@ -1178,7 +1053,7 @@
               <a:t> </a:t>
             </a:r>
             <a:r>
-              <a:rPr lang="de-DE" sz="1050" b="1" dirty="0" smtClean="0">
+              <a:rPr lang="de-DE" sz="1050" b="1" dirty="0">
                 <a:solidFill>
                   <a:schemeClr val="bg1"/>
                 </a:solidFill>
@@ -1187,13 +1062,6 @@
               </a:rPr>
               <a:t>TCR 08</a:t>
             </a:r>
-            <a:endParaRPr lang="de-DE" sz="1050" b="1" dirty="0">
-              <a:solidFill>
-                <a:schemeClr val="bg1"/>
-              </a:solidFill>
-              <a:latin typeface="Avenir Heavy"/>
-              <a:cs typeface="Avenir Heavy"/>
-            </a:endParaRPr>
           </a:p>
         </p:txBody>
       </p:sp>
@@ -1576,17 +1444,16 @@
           <a:lstStyle/>
           <a:p>
             <a:r>
-              <a:rPr lang="de-DE" dirty="0" smtClean="0">
+              <a:rPr lang="de-DE" dirty="0">
                 <a:latin typeface="Avenir Heavy"/>
                 <a:cs typeface="Avenir Heavy"/>
               </a:rPr>
               <a:t>REZEN</a:t>
             </a:r>
             <a:r>
-              <a:rPr lang="de-DE" dirty="0" smtClean="0"/>
+              <a:rPr lang="de-DE" dirty="0"/>
               <a:t>SION</a:t>
             </a:r>
-            <a:endParaRPr lang="de-DE" dirty="0"/>
           </a:p>
         </p:txBody>
       </p:sp>
@@ -1629,7 +1496,7 @@
           <a:p>
             <a:r>
               <a:rPr lang="de-DE" sz="1200" dirty="0"/>
-              <a:t>Je mehr Feedback umso besser und umso mehr entspricht Dein Training, dem, was Dein Team unterstützen kann und will. Deine Zertifizieren bekommen dadurch auch einen tieferen Einblick in Dein Training. </a:t>
+              <a:t>Je mehr Feedback umso besser und umso mehr entspricht Dein Training, dem, was Dein Team unterstützen kann und will. Personen, die Dich zertifizieren, bekommen dadurch ebenfalls einen tieferen Einblick in Dein Training. </a:t>
             </a:r>
           </a:p>
           <a:p>
@@ -1659,7 +1526,6 @@
               <a:rPr lang="de-DE" sz="1200" dirty="0"/>
               <a:t>Am Ende bleibst Du aber der Autor der Karte. Fühle Dich nicht verpflichtet allen Rezensionen 100% gerecht zu werden, sondern nimm sie als Perspektiven, die Deine Karte verbessern. Arbeite das ein, was Du als gute Idee empfindest und frage nach, wenn Du nicht verstehst, warum etwas auf Widerstand gestoßen ist.</a:t>
             </a:r>
-            <a:endParaRPr lang="de-DE" sz="1200" dirty="0"/>
           </a:p>
         </p:txBody>
       </p:sp>
@@ -1682,10 +1548,9 @@
               <a:buNone/>
             </a:pPr>
             <a:r>
-              <a:rPr lang="de-DE" dirty="0" smtClean="0"/>
+              <a:rPr lang="de-DE" dirty="0"/>
               <a:t>Regina Brandhuber</a:t>
             </a:r>
-            <a:endParaRPr lang="de-DE" dirty="0"/>
           </a:p>
         </p:txBody>
       </p:sp>
@@ -1736,27 +1601,14 @@
           <a:p>
             <a:r>
               <a:rPr lang="de-DE" dirty="0"/>
-              <a:t>Trainiere diese Karte (insgesamt 2 Mal) direkt als Folgekarte nach TRC </a:t>
-            </a:r>
-            <a:r>
-              <a:rPr lang="de-DE" dirty="0" smtClean="0"/>
-              <a:t>07. </a:t>
-            </a:r>
+              <a:t>Trainiere diese Karte (insgesamt 2 Mal) direkt als Folgekarte nach TRC 07. Somit erlebst Du diesen Move in zwei verschiedenen Varianten.</a:t>
+            </a:r>
+          </a:p>
+          <a:p>
             <a:r>
               <a:rPr lang="de-DE" dirty="0"/>
-              <a:t>Somit erlebst Du diesen Move in zwei verschiedenen Varianten.</a:t>
-            </a:r>
-          </a:p>
-          <a:p>
-            <a:r>
-              <a:rPr lang="de-DE" dirty="0"/>
-              <a:t>Für jede Variante (also für jede Erstellung einer Trainingskarte) hast du 2 Wochen Zeit, also insgesamt 4 Wochen. Natürlich kannst Du auch gleich 2 Trainingskarten parallel entstehen lassen und diese Karte zusammen mit den anderen verschränkten Karten innerhalb von 2 Wochen erledigen</a:t>
-            </a:r>
-            <a:r>
-              <a:rPr lang="de-DE" dirty="0" smtClean="0"/>
-              <a:t>.</a:t>
-            </a:r>
-            <a:endParaRPr lang="de-DE" dirty="0"/>
+              <a:t>Für jede Variante (also für jede Erstellung einer Trainingskarte) hast du 2 Wochen Zeit, also insgesamt 4 Wochen. Natürlich kannst Du auch gleich 2 Trainingskarten parallel entstehen lassen und diese Karte zusammen mit den anderen Karten verschränkt innerhalb von 2 Wochen erledigen.</a:t>
+            </a:r>
           </a:p>
           <a:p>
             <a:r>
@@ -1769,48 +1621,340 @@
               <a:rPr lang="de-DE" dirty="0"/>
               <a:t>Arbeite die Rezensionen ein und lass Dich zertifizierten, wenn Du 2 Trainingskarten </a:t>
             </a:r>
-            <a:r>
-              <a:rPr lang="de-DE" dirty="0" smtClean="0"/>
-              <a:t/>
-            </a:r>
             <a:br>
-              <a:rPr lang="de-DE" dirty="0" smtClean="0"/>
+              <a:rPr lang="de-DE" dirty="0"/>
             </a:br>
             <a:r>
-              <a:rPr lang="de-DE" dirty="0" smtClean="0"/>
-              <a:t>geschrieben und </a:t>
-            </a:r>
-            <a:r>
               <a:rPr lang="de-DE" dirty="0"/>
-              <a:t>in Deinem Team oder </a:t>
-            </a:r>
-            <a:r>
-              <a:rPr lang="de-DE" dirty="0" smtClean="0"/>
-              <a:t>auf </a:t>
-            </a:r>
-            <a:r>
-              <a:rPr lang="de-DE" dirty="0" err="1" smtClean="0"/>
-              <a:t>www.music-</a:t>
-            </a:r>
-            <a:r>
-              <a:rPr lang="de-DE" err="1" smtClean="0"/>
-              <a:t>moves.de</a:t>
-            </a:r>
-            <a:r>
-              <a:rPr lang="de-DE" dirty="0" smtClean="0"/>
-              <a:t> veröffentlicht</a:t>
-            </a:r>
-            <a:br>
-              <a:rPr lang="de-DE" dirty="0" smtClean="0"/>
-            </a:br>
-            <a:r>
-              <a:rPr lang="de-DE" dirty="0" smtClean="0"/>
-              <a:t>hast.</a:t>
-            </a:r>
-            <a:endParaRPr lang="de-DE" dirty="0"/>
+              <a:t>geschrieben und innerhalb </a:t>
+            </a:r>
+            <a:r>
+              <a:rPr lang="de-DE"/>
+              <a:t>Deines Teams veröffentlicht</a:t>
+            </a:r>
+            <a:r>
+              <a:rPr lang="de-DE" dirty="0"/>
+              <a:t> </a:t>
+            </a:r>
+            <a:r>
+              <a:rPr lang="de-DE"/>
+              <a:t>hast</a:t>
+            </a:r>
+            <a:r>
+              <a:rPr lang="de-DE" dirty="0"/>
+              <a:t>.</a:t>
+            </a:r>
           </a:p>
         </p:txBody>
       </p:sp>
+      <p:sp>
+        <p:nvSpPr>
+          <p:cNvPr id="3" name="Shape 7">
+            <a:extLst>
+              <a:ext uri="{FF2B5EF4-FFF2-40B4-BE49-F238E27FC236}">
+                <a16:creationId xmlns:a16="http://schemas.microsoft.com/office/drawing/2014/main" id="{A96CA831-43F6-CF12-B28E-3389F20963C5}"/>
+              </a:ext>
+            </a:extLst>
+          </p:cNvPr>
+          <p:cNvSpPr/>
+          <p:nvPr/>
+        </p:nvSpPr>
+        <p:spPr>
+          <a:xfrm>
+            <a:off x="971550" y="4689585"/>
+            <a:ext cx="4691860" cy="461661"/>
+          </a:xfrm>
+          <a:prstGeom prst="rect">
+            <a:avLst/>
+          </a:prstGeom>
+          <a:ln w="12700">
+            <a:miter lim="400000"/>
+          </a:ln>
+          <a:extLst>
+            <a:ext uri="{C572A759-6A51-4108-AA02-DFA0A04FC94B}">
+              <ma14:wrappingTextBoxFlag xmlns:ma14="http://schemas.microsoft.com/office/mac/drawingml/2011/main" xmlns="" val="1"/>
+            </a:ext>
+          </a:extLst>
+        </p:spPr>
+        <p:txBody>
+          <a:bodyPr wrap="square" lIns="45718" tIns="45718" rIns="45718" bIns="45718">
+            <a:spAutoFit/>
+          </a:bodyPr>
+          <a:lstStyle/>
+          <a:p>
+            <a:pPr lvl="0" algn="ctr">
+              <a:defRPr sz="1800"/>
+            </a:pPr>
+            <a:r>
+              <a:rPr lang="de-DE" sz="800" b="0" i="0" u="none" strike="noStrike" dirty="0" err="1">
+                <a:solidFill>
+                  <a:schemeClr val="tx1">
+                    <a:lumMod val="65000"/>
+                    <a:lumOff val="35000"/>
+                  </a:schemeClr>
+                </a:solidFill>
+                <a:effectLst/>
+                <a:latin typeface="Avenir Book" panose="02000503020000020003" pitchFamily="2" charset="0"/>
+              </a:rPr>
+              <a:t>music</a:t>
+            </a:r>
+            <a:r>
+              <a:rPr lang="de-DE" sz="800" b="0" i="0" u="none" strike="noStrike" dirty="0">
+                <a:solidFill>
+                  <a:schemeClr val="tx1">
+                    <a:lumMod val="65000"/>
+                    <a:lumOff val="35000"/>
+                  </a:schemeClr>
+                </a:solidFill>
+                <a:effectLst/>
+                <a:latin typeface="Avenir Book" panose="02000503020000020003" pitchFamily="2" charset="0"/>
+              </a:rPr>
+              <a:t> </a:t>
+            </a:r>
+            <a:r>
+              <a:rPr lang="de-DE" sz="800" b="0" i="0" u="none" strike="noStrike" dirty="0" err="1">
+                <a:solidFill>
+                  <a:schemeClr val="tx1">
+                    <a:lumMod val="65000"/>
+                    <a:lumOff val="35000"/>
+                  </a:schemeClr>
+                </a:solidFill>
+                <a:effectLst/>
+                <a:latin typeface="Avenir Book" panose="02000503020000020003" pitchFamily="2" charset="0"/>
+              </a:rPr>
+              <a:t>moves</a:t>
+            </a:r>
+            <a:r>
+              <a:rPr lang="de-DE" sz="800" b="0" i="0" u="none" strike="noStrike" dirty="0">
+                <a:solidFill>
+                  <a:schemeClr val="tx1">
+                    <a:lumMod val="65000"/>
+                    <a:lumOff val="35000"/>
+                  </a:schemeClr>
+                </a:solidFill>
+                <a:effectLst/>
+                <a:latin typeface="Avenir Book" panose="02000503020000020003" pitchFamily="2" charset="0"/>
+              </a:rPr>
+              <a:t>-Trainingskarten von Regina Brandhuber sind lizenziert unter einer Creative Commons </a:t>
+            </a:r>
+          </a:p>
+          <a:p>
+            <a:pPr lvl="0" algn="ctr">
+              <a:defRPr sz="1800"/>
+            </a:pPr>
+            <a:r>
+              <a:rPr lang="de-DE" sz="800" b="0" i="0" u="none" strike="noStrike" dirty="0">
+                <a:solidFill>
+                  <a:schemeClr val="tx1">
+                    <a:lumMod val="65000"/>
+                    <a:lumOff val="35000"/>
+                  </a:schemeClr>
+                </a:solidFill>
+                <a:effectLst/>
+                <a:latin typeface="Avenir Book" panose="02000503020000020003" pitchFamily="2" charset="0"/>
+              </a:rPr>
+              <a:t>Namensnennung-Nicht kommerziell 4.0 International Lizenz.</a:t>
+            </a:r>
+          </a:p>
+          <a:p>
+            <a:pPr lvl="0" algn="ctr">
+              <a:defRPr sz="1800"/>
+            </a:pPr>
+            <a:r>
+              <a:rPr lang="de-DE" sz="800" dirty="0">
+                <a:solidFill>
+                  <a:schemeClr val="tx1">
+                    <a:lumMod val="65000"/>
+                    <a:lumOff val="35000"/>
+                  </a:schemeClr>
+                </a:solidFill>
+                <a:latin typeface="Avenir Book" panose="02000503020000020003" pitchFamily="2" charset="0"/>
+                <a:ea typeface="Calibri"/>
+                <a:cs typeface="Avenir Light"/>
+                <a:sym typeface="Calibri"/>
+              </a:rPr>
+              <a:t>Nachzulesen unter:</a:t>
+            </a:r>
+            <a:r>
+              <a:rPr sz="800" dirty="0">
+                <a:solidFill>
+                  <a:schemeClr val="tx1">
+                    <a:lumMod val="65000"/>
+                    <a:lumOff val="35000"/>
+                  </a:schemeClr>
+                </a:solidFill>
+                <a:latin typeface="Avenir Book" panose="02000503020000020003" pitchFamily="2" charset="0"/>
+                <a:ea typeface="Calibri"/>
+                <a:cs typeface="Avenir Light"/>
+                <a:sym typeface="Calibri"/>
+              </a:rPr>
+              <a:t> </a:t>
+            </a:r>
+            <a:r>
+              <a:rPr lang="de-DE" sz="800" dirty="0">
+                <a:solidFill>
+                  <a:schemeClr val="tx1">
+                    <a:lumMod val="65000"/>
+                    <a:lumOff val="35000"/>
+                  </a:schemeClr>
+                </a:solidFill>
+                <a:latin typeface="Avenir Book" panose="02000503020000020003" pitchFamily="2" charset="0"/>
+                <a:ea typeface="Calibri"/>
+                <a:cs typeface="Avenir Light"/>
+                <a:sym typeface="Calibri"/>
+              </a:rPr>
+              <a:t>https://</a:t>
+            </a:r>
+            <a:r>
+              <a:rPr lang="de-DE" sz="800" dirty="0" err="1">
+                <a:solidFill>
+                  <a:schemeClr val="tx1">
+                    <a:lumMod val="65000"/>
+                    <a:lumOff val="35000"/>
+                  </a:schemeClr>
+                </a:solidFill>
+                <a:latin typeface="Avenir Book" panose="02000503020000020003" pitchFamily="2" charset="0"/>
+                <a:ea typeface="Calibri"/>
+                <a:cs typeface="Avenir Light"/>
+                <a:sym typeface="Calibri"/>
+              </a:rPr>
+              <a:t>creativecommons.org</a:t>
+            </a:r>
+            <a:r>
+              <a:rPr lang="de-DE" sz="800" dirty="0">
+                <a:solidFill>
+                  <a:schemeClr val="tx1">
+                    <a:lumMod val="65000"/>
+                    <a:lumOff val="35000"/>
+                  </a:schemeClr>
+                </a:solidFill>
+                <a:latin typeface="Avenir Book" panose="02000503020000020003" pitchFamily="2" charset="0"/>
+                <a:ea typeface="Calibri"/>
+                <a:cs typeface="Avenir Light"/>
+                <a:sym typeface="Calibri"/>
+              </a:rPr>
+              <a:t>/</a:t>
+            </a:r>
+            <a:r>
+              <a:rPr lang="de-DE" sz="800" dirty="0" err="1">
+                <a:solidFill>
+                  <a:schemeClr val="tx1">
+                    <a:lumMod val="65000"/>
+                    <a:lumOff val="35000"/>
+                  </a:schemeClr>
+                </a:solidFill>
+                <a:latin typeface="Avenir Book" panose="02000503020000020003" pitchFamily="2" charset="0"/>
+                <a:ea typeface="Calibri"/>
+                <a:cs typeface="Avenir Light"/>
+                <a:sym typeface="Calibri"/>
+              </a:rPr>
+              <a:t>licenses</a:t>
+            </a:r>
+            <a:r>
+              <a:rPr lang="de-DE" sz="800" dirty="0">
+                <a:solidFill>
+                  <a:schemeClr val="tx1">
+                    <a:lumMod val="65000"/>
+                    <a:lumOff val="35000"/>
+                  </a:schemeClr>
+                </a:solidFill>
+                <a:latin typeface="Avenir Book" panose="02000503020000020003" pitchFamily="2" charset="0"/>
+                <a:ea typeface="Calibri"/>
+                <a:cs typeface="Avenir Light"/>
+                <a:sym typeface="Calibri"/>
+              </a:rPr>
+              <a:t>/</a:t>
+            </a:r>
+            <a:r>
+              <a:rPr lang="de-DE" sz="800" dirty="0" err="1">
+                <a:solidFill>
+                  <a:schemeClr val="tx1">
+                    <a:lumMod val="65000"/>
+                    <a:lumOff val="35000"/>
+                  </a:schemeClr>
+                </a:solidFill>
+                <a:latin typeface="Avenir Book" panose="02000503020000020003" pitchFamily="2" charset="0"/>
+                <a:ea typeface="Calibri"/>
+                <a:cs typeface="Avenir Light"/>
+                <a:sym typeface="Calibri"/>
+              </a:rPr>
+              <a:t>by-nc</a:t>
+            </a:r>
+            <a:r>
+              <a:rPr lang="de-DE" sz="800" dirty="0">
+                <a:solidFill>
+                  <a:schemeClr val="tx1">
+                    <a:lumMod val="65000"/>
+                    <a:lumOff val="35000"/>
+                  </a:schemeClr>
+                </a:solidFill>
+                <a:latin typeface="Avenir Book" panose="02000503020000020003" pitchFamily="2" charset="0"/>
+                <a:ea typeface="Calibri"/>
+                <a:cs typeface="Avenir Light"/>
+                <a:sym typeface="Calibri"/>
+              </a:rPr>
+              <a:t>/4.0/</a:t>
+            </a:r>
+            <a:r>
+              <a:rPr lang="de-DE" sz="800" dirty="0" err="1">
+                <a:solidFill>
+                  <a:schemeClr val="tx1">
+                    <a:lumMod val="65000"/>
+                    <a:lumOff val="35000"/>
+                  </a:schemeClr>
+                </a:solidFill>
+                <a:latin typeface="Avenir Book" panose="02000503020000020003" pitchFamily="2" charset="0"/>
+                <a:ea typeface="Calibri"/>
+                <a:cs typeface="Avenir Light"/>
+                <a:sym typeface="Calibri"/>
+              </a:rPr>
+              <a:t>deed.de</a:t>
+            </a:r>
+            <a:endParaRPr sz="800" dirty="0">
+              <a:solidFill>
+                <a:schemeClr val="tx1">
+                  <a:lumMod val="65000"/>
+                  <a:lumOff val="35000"/>
+                </a:schemeClr>
+              </a:solidFill>
+              <a:latin typeface="Avenir Book" panose="02000503020000020003" pitchFamily="2" charset="0"/>
+              <a:ea typeface="Calibri"/>
+              <a:cs typeface="Avenir Light"/>
+              <a:sym typeface="Calibri"/>
+            </a:endParaRPr>
+          </a:p>
+        </p:txBody>
+      </p:sp>
+      <p:pic>
+        <p:nvPicPr>
+          <p:cNvPr id="4" name="pasted-image.tif">
+            <a:extLst>
+              <a:ext uri="{FF2B5EF4-FFF2-40B4-BE49-F238E27FC236}">
+                <a16:creationId xmlns:a16="http://schemas.microsoft.com/office/drawing/2014/main" id="{43A1AE04-B3FA-511B-8DF0-2B8AF1BA6148}"/>
+              </a:ext>
+            </a:extLst>
+          </p:cNvPr>
+          <p:cNvPicPr/>
+          <p:nvPr/>
+        </p:nvPicPr>
+        <p:blipFill rotWithShape="1">
+          <a:blip r:embed="rId2"/>
+          <a:srcRect r="24777" b="-3233"/>
+          <a:stretch/>
+        </p:blipFill>
+        <p:spPr>
+          <a:xfrm>
+            <a:off x="5724347" y="4733926"/>
+            <a:ext cx="1009828" cy="333374"/>
+          </a:xfrm>
+          <a:prstGeom prst="rect">
+            <a:avLst/>
+          </a:prstGeom>
+          <a:ln w="12700">
+            <a:miter lim="400000"/>
+          </a:ln>
+        </p:spPr>
+      </p:pic>
     </p:spTree>
     <p:extLst>
       <p:ext uri="{BB962C8B-B14F-4D97-AF65-F5344CB8AC3E}">

</xml_diff>